<commit_message>
modified:   exo10_16_29.pdf modified:   exo10_16_29.pptx modified:   exo10_1_15.pdf modified:   exo10_1_15.pptx
</commit_message>
<xml_diff>
--- a/ppt/Exodus/exo10_16_29.pptx
+++ b/ppt/Exodus/exo10_16_29.pptx
@@ -5,7 +5,7 @@
     <p:sldMasterId id="2147483648" r:id="rId1"/>
   </p:sldMasterIdLst>
   <p:notesMasterIdLst>
-    <p:notesMasterId r:id="rId12"/>
+    <p:notesMasterId r:id="rId11"/>
   </p:notesMasterIdLst>
   <p:sldIdLst>
     <p:sldId id="1414" r:id="rId2"/>
@@ -14,10 +14,9 @@
     <p:sldId id="1462" r:id="rId5"/>
     <p:sldId id="1466" r:id="rId6"/>
     <p:sldId id="1467" r:id="rId7"/>
-    <p:sldId id="1463" r:id="rId8"/>
-    <p:sldId id="1443" r:id="rId9"/>
-    <p:sldId id="1459" r:id="rId10"/>
-    <p:sldId id="1453" r:id="rId11"/>
+    <p:sldId id="1443" r:id="rId8"/>
+    <p:sldId id="1459" r:id="rId9"/>
+    <p:sldId id="1453" r:id="rId10"/>
   </p:sldIdLst>
   <p:sldSz cx="12192000" cy="6858000"/>
   <p:notesSz cx="6858000" cy="9144000"/>
@@ -192,20 +191,6 @@
 </p:cmLst>
 </file>
 
-<file path=ppt/comments/comment5.xml><?xml version="1.0" encoding="utf-8"?>
-<p:cmLst xmlns:a="http://schemas.openxmlformats.org/drawingml/2006/main" xmlns:r="http://schemas.openxmlformats.org/officeDocument/2006/relationships" xmlns:p="http://schemas.openxmlformats.org/presentationml/2006/main">
-  <p:cm authorId="1" dt="2025-08-03T23:06:39.012" idx="6">
-    <p:pos x="10" y="10"/>
-    <p:text>Here Iam</p:text>
-    <p:extLst>
-      <p:ext uri="{C676402C-5697-4E1C-873F-D02D1690AC5C}">
-        <p15:threadingInfo xmlns:p15="http://schemas.microsoft.com/office/powerpoint/2012/main" timeZoneBias="240"/>
-      </p:ext>
-    </p:extLst>
-  </p:cm>
-</p:cmLst>
-</file>
-
 <file path=ppt/notesMasters/notesMaster1.xml><?xml version="1.0" encoding="utf-8"?>
 <p:notesMaster xmlns:a="http://schemas.openxmlformats.org/drawingml/2006/main" xmlns:r="http://schemas.openxmlformats.org/officeDocument/2006/relationships" xmlns:p="http://schemas.openxmlformats.org/presentationml/2006/main">
   <p:cSld>
@@ -288,7 +273,7 @@
           <a:p>
             <a:fld id="{3EFD42F7-718C-4B98-AAEC-167E6DDD60A7}" type="datetimeFigureOut">
               <a:rPr lang="en-US" smtClean="0"/>
-              <a:t>8/19/25</a:t>
+              <a:t>8/31/25</a:t>
             </a:fld>
             <a:endParaRPr lang="en-US"/>
           </a:p>
@@ -784,7 +769,7 @@
           <a:p>
             <a:fld id="{63A1C593-65D0-4073-BCC9-577B9352EA97}" type="datetimeFigureOut">
               <a:rPr lang="en-US" smtClean="0"/>
-              <a:t>8/19/25</a:t>
+              <a:t>8/31/25</a:t>
             </a:fld>
             <a:endParaRPr lang="en-US"/>
           </a:p>
@@ -1030,7 +1015,7 @@
           <a:p>
             <a:fld id="{63A1C593-65D0-4073-BCC9-577B9352EA97}" type="datetimeFigureOut">
               <a:rPr lang="en-US" smtClean="0"/>
-              <a:t>8/19/25</a:t>
+              <a:t>8/31/25</a:t>
             </a:fld>
             <a:endParaRPr lang="en-US"/>
           </a:p>
@@ -1204,7 +1189,7 @@
           <a:p>
             <a:fld id="{63A1C593-65D0-4073-BCC9-577B9352EA97}" type="datetimeFigureOut">
               <a:rPr lang="en-US" smtClean="0"/>
-              <a:t>8/19/25</a:t>
+              <a:t>8/31/25</a:t>
             </a:fld>
             <a:endParaRPr lang="en-US"/>
           </a:p>
@@ -1531,7 +1516,7 @@
           <a:p>
             <a:fld id="{63A1C593-65D0-4073-BCC9-577B9352EA97}" type="datetimeFigureOut">
               <a:rPr lang="en-US" smtClean="0"/>
-              <a:t>8/19/25</a:t>
+              <a:t>8/31/25</a:t>
             </a:fld>
             <a:endParaRPr lang="en-US"/>
           </a:p>
@@ -1718,7 +1703,7 @@
           <a:p>
             <a:fld id="{63A1C593-65D0-4073-BCC9-577B9352EA97}" type="datetimeFigureOut">
               <a:rPr lang="en-US" smtClean="0"/>
-              <a:t>8/19/25</a:t>
+              <a:t>8/31/25</a:t>
             </a:fld>
             <a:endParaRPr lang="en-US"/>
           </a:p>
@@ -1943,7 +1928,7 @@
           <a:p>
             <a:fld id="{63A1C593-65D0-4073-BCC9-577B9352EA97}" type="datetimeFigureOut">
               <a:rPr lang="en-US" smtClean="0"/>
-              <a:t>8/19/25</a:t>
+              <a:t>8/31/25</a:t>
             </a:fld>
             <a:endParaRPr lang="en-US"/>
           </a:p>
@@ -2303,7 +2288,7 @@
           <a:p>
             <a:fld id="{63A1C593-65D0-4073-BCC9-577B9352EA97}" type="datetimeFigureOut">
               <a:rPr lang="en-US" smtClean="0"/>
-              <a:t>8/19/25</a:t>
+              <a:t>8/31/25</a:t>
             </a:fld>
             <a:endParaRPr lang="en-US"/>
           </a:p>
@@ -2416,7 +2401,7 @@
           <a:p>
             <a:fld id="{63A1C593-65D0-4073-BCC9-577B9352EA97}" type="datetimeFigureOut">
               <a:rPr lang="en-US" smtClean="0"/>
-              <a:t>8/19/25</a:t>
+              <a:t>8/31/25</a:t>
             </a:fld>
             <a:endParaRPr lang="en-US"/>
           </a:p>
@@ -2507,7 +2492,7 @@
           <a:p>
             <a:fld id="{63A1C593-65D0-4073-BCC9-577B9352EA97}" type="datetimeFigureOut">
               <a:rPr lang="en-US" smtClean="0"/>
-              <a:t>8/19/25</a:t>
+              <a:t>8/31/25</a:t>
             </a:fld>
             <a:endParaRPr lang="en-US"/>
           </a:p>
@@ -2778,7 +2763,7 @@
           <a:p>
             <a:fld id="{63A1C593-65D0-4073-BCC9-577B9352EA97}" type="datetimeFigureOut">
               <a:rPr lang="en-US" smtClean="0"/>
-              <a:t>8/19/25</a:t>
+              <a:t>8/31/25</a:t>
             </a:fld>
             <a:endParaRPr lang="en-US"/>
           </a:p>
@@ -3055,7 +3040,7 @@
           <a:p>
             <a:fld id="{63A1C593-65D0-4073-BCC9-577B9352EA97}" type="datetimeFigureOut">
               <a:rPr lang="en-US" smtClean="0"/>
-              <a:t>8/19/25</a:t>
+              <a:t>8/31/25</a:t>
             </a:fld>
             <a:endParaRPr lang="en-US"/>
           </a:p>
@@ -3325,7 +3310,7 @@
           <a:p>
             <a:fld id="{63A1C593-65D0-4073-BCC9-577B9352EA97}" type="datetimeFigureOut">
               <a:rPr lang="en-US" smtClean="0"/>
-              <a:t>8/19/25</a:t>
+              <a:t>8/31/25</a:t>
             </a:fld>
             <a:endParaRPr lang="en-US"/>
           </a:p>
@@ -4200,273 +4185,6 @@
 </p:sld>
 </file>
 
-<file path=ppt/slides/slide10.xml><?xml version="1.0" encoding="utf-8"?>
-<p:sld xmlns:a="http://schemas.openxmlformats.org/drawingml/2006/main" xmlns:r="http://schemas.openxmlformats.org/officeDocument/2006/relationships" xmlns:p="http://schemas.openxmlformats.org/presentationml/2006/main">
-  <p:cSld>
-    <p:spTree>
-      <p:nvGrpSpPr>
-        <p:cNvPr id="1" name=""/>
-        <p:cNvGrpSpPr/>
-        <p:nvPr/>
-      </p:nvGrpSpPr>
-      <p:grpSpPr>
-        <a:xfrm>
-          <a:off x="0" y="0"/>
-          <a:ext cx="0" cy="0"/>
-          <a:chOff x="0" y="0"/>
-          <a:chExt cx="0" cy="0"/>
-        </a:xfrm>
-      </p:grpSpPr>
-      <p:sp>
-        <p:nvSpPr>
-          <p:cNvPr id="2" name="Title 1"/>
-          <p:cNvSpPr>
-            <a:spLocks noGrp="1"/>
-          </p:cNvSpPr>
-          <p:nvPr>
-            <p:ph type="title"/>
-          </p:nvPr>
-        </p:nvSpPr>
-        <p:spPr/>
-        <p:txBody>
-          <a:bodyPr/>
-          <a:lstStyle/>
-          <a:p>
-            <a:endParaRPr lang="en-US"/>
-          </a:p>
-        </p:txBody>
-      </p:sp>
-      <p:pic>
-        <p:nvPicPr>
-          <p:cNvPr id="7" name="Content Placeholder 6" descr="Screenshot 2025-07-31 213648"/>
-          <p:cNvPicPr>
-            <a:picLocks noGrp="1" noChangeAspect="1"/>
-          </p:cNvPicPr>
-          <p:nvPr>
-            <p:ph sz="half" idx="2"/>
-          </p:nvPr>
-        </p:nvPicPr>
-        <p:blipFill>
-          <a:blip r:embed="rId2"/>
-          <a:srcRect r="15739" b="9740"/>
-          <a:stretch>
-            <a:fillRect/>
-          </a:stretch>
-        </p:blipFill>
-        <p:spPr>
-          <a:xfrm>
-            <a:off x="6443980" y="633095"/>
-            <a:ext cx="5289550" cy="3101975"/>
-          </a:xfrm>
-          <a:prstGeom prst="rect">
-            <a:avLst/>
-          </a:prstGeom>
-        </p:spPr>
-      </p:pic>
-      <p:sp>
-        <p:nvSpPr>
-          <p:cNvPr id="6" name="Text Box 5"/>
-          <p:cNvSpPr txBox="1"/>
-          <p:nvPr/>
-        </p:nvSpPr>
-        <p:spPr>
-          <a:xfrm>
-            <a:off x="458470" y="2784108"/>
-            <a:ext cx="5203191" cy="2308324"/>
-          </a:xfrm>
-          <a:prstGeom prst="rect">
-            <a:avLst/>
-          </a:prstGeom>
-          <a:noFill/>
-        </p:spPr>
-        <p:txBody>
-          <a:bodyPr wrap="square" rtlCol="0" anchor="t">
-            <a:spAutoFit/>
-          </a:bodyPr>
-          <a:lstStyle/>
-          <a:p>
-            <a:pPr marL="635" indent="-635">
-              <a:buNone/>
-            </a:pPr>
-            <a:r>
-              <a:rPr lang="en-US" altLang="en-US" sz="2400" dirty="0">
-                <a:sym typeface="+mn-ea"/>
-              </a:rPr>
-              <a:t>1.No Turning Back</a:t>
-            </a:r>
-          </a:p>
-          <a:p>
-            <a:pPr marL="635" indent="-635">
-              <a:buNone/>
-            </a:pPr>
-            <a:r>
-              <a:rPr lang="en-US" altLang="en-US" sz="2400" dirty="0">
-                <a:solidFill>
-                  <a:srgbClr val="FF0000"/>
-                </a:solidFill>
-                <a:sym typeface="+mn-ea"/>
-                <a:hlinkClick r:id="rId3"/>
-              </a:rPr>
-              <a:t>https://</a:t>
-            </a:r>
-            <a:r>
-              <a:rPr lang="en-US" altLang="en-US" sz="2400" dirty="0" err="1">
-                <a:solidFill>
-                  <a:srgbClr val="FF0000"/>
-                </a:solidFill>
-                <a:sym typeface="+mn-ea"/>
-                <a:hlinkClick r:id="rId3"/>
-              </a:rPr>
-              <a:t>www.youtube.com</a:t>
-            </a:r>
-            <a:r>
-              <a:rPr lang="en-US" altLang="en-US" sz="2400" dirty="0">
-                <a:solidFill>
-                  <a:srgbClr val="FF0000"/>
-                </a:solidFill>
-                <a:sym typeface="+mn-ea"/>
-                <a:hlinkClick r:id="rId3"/>
-              </a:rPr>
-              <a:t>/</a:t>
-            </a:r>
-            <a:r>
-              <a:rPr lang="en-US" altLang="en-US" sz="2400" dirty="0" err="1">
-                <a:solidFill>
-                  <a:srgbClr val="FF0000"/>
-                </a:solidFill>
-                <a:sym typeface="+mn-ea"/>
-                <a:hlinkClick r:id="rId3"/>
-              </a:rPr>
-              <a:t>watch?v</a:t>
-            </a:r>
-            <a:r>
-              <a:rPr lang="en-US" altLang="en-US" sz="2400" dirty="0">
-                <a:solidFill>
-                  <a:srgbClr val="FF0000"/>
-                </a:solidFill>
-                <a:sym typeface="+mn-ea"/>
-                <a:hlinkClick r:id="rId3"/>
-              </a:rPr>
-              <a:t>=yNtid3wdDWA&amp;list=RDyNtid3wdDWA&amp;start_radio=1&amp;ab_channel=</a:t>
-            </a:r>
-            <a:r>
-              <a:rPr lang="en-US" altLang="en-US" sz="2400" dirty="0" err="1">
-                <a:solidFill>
-                  <a:srgbClr val="FF0000"/>
-                </a:solidFill>
-                <a:sym typeface="+mn-ea"/>
-                <a:hlinkClick r:id="rId3"/>
-              </a:rPr>
-              <a:t>GaiseBaba</a:t>
-            </a:r>
-            <a:r>
-              <a:rPr lang="en-US" altLang="en-US" sz="2400" dirty="0">
-                <a:sym typeface="+mn-ea"/>
-                <a:hlinkClick r:id="rId3"/>
-              </a:rPr>
-              <a:t>         </a:t>
-            </a:r>
-            <a:endParaRPr lang="en-US" altLang="en-US" sz="2400" dirty="0">
-              <a:sym typeface="+mn-ea"/>
-            </a:endParaRPr>
-          </a:p>
-          <a:p>
-            <a:pPr marL="635" indent="-635">
-              <a:buNone/>
-            </a:pPr>
-            <a:r>
-              <a:rPr lang="en-US" altLang="en-US" sz="2400" dirty="0">
-                <a:sym typeface="+mn-ea"/>
-              </a:rPr>
-              <a:t>Christian Kids</a:t>
-            </a:r>
-          </a:p>
-        </p:txBody>
-      </p:sp>
-      <p:sp>
-        <p:nvSpPr>
-          <p:cNvPr id="8" name="Text Box 7"/>
-          <p:cNvSpPr txBox="1"/>
-          <p:nvPr/>
-        </p:nvSpPr>
-        <p:spPr>
-          <a:xfrm>
-            <a:off x="6443980" y="3938270"/>
-            <a:ext cx="5399405" cy="2308324"/>
-          </a:xfrm>
-          <a:prstGeom prst="rect">
-            <a:avLst/>
-          </a:prstGeom>
-          <a:noFill/>
-        </p:spPr>
-        <p:txBody>
-          <a:bodyPr wrap="square" rtlCol="0" anchor="t">
-            <a:spAutoFit/>
-          </a:bodyPr>
-          <a:lstStyle/>
-          <a:p>
-            <a:pPr marL="0" indent="0" algn="l">
-              <a:buNone/>
-            </a:pPr>
-            <a:r>
-              <a:rPr lang="en-US" altLang="en-US" sz="2000" dirty="0">
-                <a:sym typeface="+mn-ea"/>
-              </a:rPr>
-              <a:t>2</a:t>
-            </a:r>
-            <a:r>
-              <a:rPr lang="en-US" altLang="en-US" sz="2400" dirty="0">
-                <a:sym typeface="+mn-ea"/>
-              </a:rPr>
-              <a:t>.</a:t>
-            </a:r>
-            <a:r>
-              <a:rPr lang="en-US" altLang="en-US" sz="2400" dirty="0">
-                <a:solidFill>
-                  <a:srgbClr val="FF0000"/>
-                </a:solidFill>
-                <a:sym typeface="+mn-ea"/>
-              </a:rPr>
-              <a:t> The Song of Moses </a:t>
-            </a:r>
-            <a:r>
-              <a:rPr lang="en-US" altLang="en-US" sz="2400" dirty="0">
-                <a:solidFill>
-                  <a:srgbClr val="00B050"/>
-                </a:solidFill>
-                <a:sym typeface="+mn-ea"/>
-                <a:hlinkClick r:id="rId4"/>
-              </a:rPr>
-              <a:t>https://www.youtube.com/watch?v=a-wWKL-7Mrg</a:t>
-            </a:r>
-            <a:endParaRPr lang="en-US" altLang="en-US" sz="2400" dirty="0">
-              <a:solidFill>
-                <a:srgbClr val="00B050"/>
-              </a:solidFill>
-              <a:sym typeface="+mn-ea"/>
-            </a:endParaRPr>
-          </a:p>
-          <a:p>
-            <a:pPr marL="0" indent="0" algn="l">
-              <a:buNone/>
-            </a:pPr>
-            <a:r>
-              <a:rPr lang="en-US" altLang="en-US" sz="2400" dirty="0">
-                <a:sym typeface="+mn-ea"/>
-              </a:rPr>
-              <a:t>The Song of Moses Like You've Never Heard Before | Christian Worship Song/  World Wide Worship</a:t>
-            </a:r>
-          </a:p>
-        </p:txBody>
-      </p:sp>
-    </p:spTree>
-  </p:cSld>
-  <p:clrMapOvr>
-    <a:masterClrMapping/>
-  </p:clrMapOvr>
-</p:sld>
-</file>
-
 <file path=ppt/slides/slide2.xml><?xml version="1.0" encoding="utf-8"?>
 <p:sld xmlns:a="http://schemas.openxmlformats.org/drawingml/2006/main" xmlns:r="http://schemas.openxmlformats.org/officeDocument/2006/relationships" xmlns:p="http://schemas.openxmlformats.org/presentationml/2006/main">
   <p:cSld>
@@ -4535,6 +4253,13 @@
             <a:r>
               <a:rPr lang="en-US" dirty="0"/>
               <a:t>English Version Video: Exodus 10:16-29.</a:t>
+            </a:r>
+            <a:br>
+              <a:rPr lang="en-US" dirty="0"/>
+            </a:br>
+            <a:r>
+              <a:rPr lang="en-US" dirty="0"/>
+              <a:t>(start as 2:00)</a:t>
             </a:r>
           </a:p>
         </p:txBody>
@@ -5387,562 +5112,6 @@
       </p:grpSpPr>
       <p:sp>
         <p:nvSpPr>
-          <p:cNvPr id="3" name="Content Placeholder 2"/>
-          <p:cNvSpPr>
-            <a:spLocks noGrp="1"/>
-          </p:cNvSpPr>
-          <p:nvPr>
-            <p:ph idx="1"/>
-          </p:nvPr>
-        </p:nvSpPr>
-        <p:spPr>
-          <a:xfrm>
-            <a:off x="609600" y="5064387"/>
-            <a:ext cx="1617980" cy="1459523"/>
-          </a:xfrm>
-          <a:solidFill>
-            <a:srgbClr val="FFFF00"/>
-          </a:solidFill>
-          <a:effectLst>
-            <a:softEdge rad="123960"/>
-          </a:effectLst>
-        </p:spPr>
-        <p:txBody>
-          <a:bodyPr lIns="91440" tIns="274320"/>
-          <a:lstStyle/>
-          <a:p>
-            <a:pPr marL="0" indent="0" algn="ctr">
-              <a:buNone/>
-            </a:pPr>
-            <a:r>
-              <a:rPr lang="en-US" altLang="zh-CN" sz="2600" dirty="0"/>
-              <a:t> Parents</a:t>
-            </a:r>
-          </a:p>
-          <a:p>
-            <a:pPr marL="0" indent="0" algn="ctr">
-              <a:buNone/>
-            </a:pPr>
-            <a:r>
-              <a:rPr lang="ja-JP" altLang="en-US" sz="2600"/>
-              <a:t>父母</a:t>
-            </a:r>
-            <a:endParaRPr lang="en-US" altLang="zh-CN" sz="2800" dirty="0">
-              <a:sym typeface="+mn-ea"/>
-            </a:endParaRPr>
-          </a:p>
-        </p:txBody>
-      </p:sp>
-      <p:sp>
-        <p:nvSpPr>
-          <p:cNvPr id="6" name="Text Box 4">
-            <a:extLst>
-              <a:ext uri="{FF2B5EF4-FFF2-40B4-BE49-F238E27FC236}">
-                <a16:creationId xmlns:a16="http://schemas.microsoft.com/office/drawing/2014/main" id="{B6655BF6-D255-AABC-17CC-BC1DA1367253}"/>
-              </a:ext>
-            </a:extLst>
-          </p:cNvPr>
-          <p:cNvSpPr txBox="1"/>
-          <p:nvPr/>
-        </p:nvSpPr>
-        <p:spPr>
-          <a:xfrm>
-            <a:off x="5043557" y="1898862"/>
-            <a:ext cx="1412435" cy="646331"/>
-          </a:xfrm>
-          <a:prstGeom prst="rect">
-            <a:avLst/>
-          </a:prstGeom>
-          <a:solidFill>
-            <a:schemeClr val="accent1"/>
-          </a:solidFill>
-          <a:ln>
-            <a:solidFill>
-              <a:schemeClr val="tx1"/>
-            </a:solidFill>
-          </a:ln>
-          <a:effectLst>
-            <a:softEdge rad="65871"/>
-          </a:effectLst>
-          <a:scene3d>
-            <a:camera prst="orthographicFront"/>
-            <a:lightRig rig="threePt" dir="t"/>
-          </a:scene3d>
-          <a:sp3d>
-            <a:bevelT h="31750"/>
-          </a:sp3d>
-        </p:spPr>
-        <p:txBody>
-          <a:bodyPr wrap="square" anchor="ctr" anchorCtr="0">
-            <a:spAutoFit/>
-          </a:bodyPr>
-          <a:lstStyle/>
-          <a:p>
-            <a:pPr algn="ctr"/>
-            <a:r>
-              <a:rPr lang="en-US" sz="3600" b="1" dirty="0">
-                <a:solidFill>
-                  <a:srgbClr val="000000"/>
-                </a:solidFill>
-                <a:latin typeface="PMingLiU"/>
-                <a:ea typeface="PMingLiU"/>
-              </a:rPr>
-              <a:t>God</a:t>
-            </a:r>
-            <a:endParaRPr sz="3600" b="1" dirty="0">
-              <a:solidFill>
-                <a:srgbClr val="000000"/>
-              </a:solidFill>
-              <a:latin typeface="PMingLiU"/>
-              <a:ea typeface="PMingLiU"/>
-            </a:endParaRPr>
-          </a:p>
-        </p:txBody>
-      </p:sp>
-      <p:sp>
-        <p:nvSpPr>
-          <p:cNvPr id="8" name="Content Placeholder 2">
-            <a:extLst>
-              <a:ext uri="{FF2B5EF4-FFF2-40B4-BE49-F238E27FC236}">
-                <a16:creationId xmlns:a16="http://schemas.microsoft.com/office/drawing/2014/main" id="{588FD68E-2116-0BB4-066E-8871FD5888E8}"/>
-              </a:ext>
-            </a:extLst>
-          </p:cNvPr>
-          <p:cNvSpPr txBox="1">
-            <a:spLocks/>
-          </p:cNvSpPr>
-          <p:nvPr/>
-        </p:nvSpPr>
-        <p:spPr>
-          <a:xfrm>
-            <a:off x="9827480" y="5064387"/>
-            <a:ext cx="1617980" cy="1459523"/>
-          </a:xfrm>
-          <a:prstGeom prst="rect">
-            <a:avLst/>
-          </a:prstGeom>
-          <a:solidFill>
-            <a:srgbClr val="FFFF00"/>
-          </a:solidFill>
-          <a:ln w="9525">
-            <a:noFill/>
-          </a:ln>
-          <a:effectLst>
-            <a:softEdge rad="95834"/>
-          </a:effectLst>
-        </p:spPr>
-        <p:txBody>
-          <a:bodyPr tIns="182880"/>
-          <a:lstStyle>
-            <a:lvl1pPr marL="342900" indent="-342900" algn="l" rtl="0" fontAlgn="base">
-              <a:spcBef>
-                <a:spcPct val="20000"/>
-              </a:spcBef>
-              <a:spcAft>
-                <a:spcPct val="0"/>
-              </a:spcAft>
-              <a:buChar char="•"/>
-              <a:defRPr sz="3200" kern="1200">
-                <a:solidFill>
-                  <a:schemeClr val="tx1"/>
-                </a:solidFill>
-                <a:latin typeface="+mn-lt"/>
-                <a:ea typeface="+mn-ea"/>
-                <a:cs typeface="+mn-cs"/>
-              </a:defRPr>
-            </a:lvl1pPr>
-            <a:lvl2pPr marL="742950" indent="-285750" algn="l" rtl="0" fontAlgn="base">
-              <a:spcBef>
-                <a:spcPct val="20000"/>
-              </a:spcBef>
-              <a:spcAft>
-                <a:spcPct val="0"/>
-              </a:spcAft>
-              <a:buChar char="–"/>
-              <a:defRPr sz="2800" kern="1200">
-                <a:solidFill>
-                  <a:schemeClr val="tx1"/>
-                </a:solidFill>
-                <a:latin typeface="+mn-lt"/>
-                <a:ea typeface="+mn-ea"/>
-                <a:cs typeface="+mn-cs"/>
-              </a:defRPr>
-            </a:lvl2pPr>
-            <a:lvl3pPr marL="1143000" indent="-228600" algn="l" rtl="0" fontAlgn="base">
-              <a:spcBef>
-                <a:spcPct val="20000"/>
-              </a:spcBef>
-              <a:spcAft>
-                <a:spcPct val="0"/>
-              </a:spcAft>
-              <a:buChar char="•"/>
-              <a:defRPr sz="2400" kern="1200">
-                <a:solidFill>
-                  <a:schemeClr val="tx1"/>
-                </a:solidFill>
-                <a:latin typeface="+mn-lt"/>
-                <a:ea typeface="+mn-ea"/>
-                <a:cs typeface="+mn-cs"/>
-              </a:defRPr>
-            </a:lvl3pPr>
-            <a:lvl4pPr marL="1600200" indent="-228600" algn="l" rtl="0" fontAlgn="base">
-              <a:spcBef>
-                <a:spcPct val="20000"/>
-              </a:spcBef>
-              <a:spcAft>
-                <a:spcPct val="0"/>
-              </a:spcAft>
-              <a:buChar char="–"/>
-              <a:defRPr sz="2000" kern="1200">
-                <a:solidFill>
-                  <a:schemeClr val="tx1"/>
-                </a:solidFill>
-                <a:latin typeface="+mn-lt"/>
-                <a:ea typeface="+mn-ea"/>
-                <a:cs typeface="+mn-cs"/>
-              </a:defRPr>
-            </a:lvl4pPr>
-            <a:lvl5pPr marL="2057400" indent="-228600" algn="l" rtl="0" fontAlgn="base">
-              <a:spcBef>
-                <a:spcPct val="20000"/>
-              </a:spcBef>
-              <a:spcAft>
-                <a:spcPct val="0"/>
-              </a:spcAft>
-              <a:buChar char="»"/>
-              <a:defRPr sz="2000" kern="1200">
-                <a:solidFill>
-                  <a:schemeClr val="tx1"/>
-                </a:solidFill>
-                <a:latin typeface="+mn-lt"/>
-                <a:ea typeface="+mn-ea"/>
-                <a:cs typeface="+mn-cs"/>
-              </a:defRPr>
-            </a:lvl5pPr>
-            <a:lvl6pPr marL="2514600" indent="-228600" algn="l" defTabSz="914400" rtl="0" eaLnBrk="1" latinLnBrk="0" hangingPunct="1">
-              <a:lnSpc>
-                <a:spcPct val="90000"/>
-              </a:lnSpc>
-              <a:spcBef>
-                <a:spcPts val="500"/>
-              </a:spcBef>
-              <a:buFont typeface="Arial" panose="020B0604020202020204" pitchFamily="34" charset="0"/>
-              <a:buChar char="•"/>
-              <a:defRPr sz="1800" kern="1200">
-                <a:solidFill>
-                  <a:schemeClr val="tx1"/>
-                </a:solidFill>
-                <a:latin typeface="+mn-lt"/>
-                <a:ea typeface="+mn-ea"/>
-                <a:cs typeface="+mn-cs"/>
-              </a:defRPr>
-            </a:lvl6pPr>
-            <a:lvl7pPr marL="2971800" indent="-228600" algn="l" defTabSz="914400" rtl="0" eaLnBrk="1" latinLnBrk="0" hangingPunct="1">
-              <a:lnSpc>
-                <a:spcPct val="90000"/>
-              </a:lnSpc>
-              <a:spcBef>
-                <a:spcPts val="500"/>
-              </a:spcBef>
-              <a:buFont typeface="Arial" panose="020B0604020202020204" pitchFamily="34" charset="0"/>
-              <a:buChar char="•"/>
-              <a:defRPr sz="1800" kern="1200">
-                <a:solidFill>
-                  <a:schemeClr val="tx1"/>
-                </a:solidFill>
-                <a:latin typeface="+mn-lt"/>
-                <a:ea typeface="+mn-ea"/>
-                <a:cs typeface="+mn-cs"/>
-              </a:defRPr>
-            </a:lvl7pPr>
-            <a:lvl8pPr marL="3429000" indent="-228600" algn="l" defTabSz="914400" rtl="0" eaLnBrk="1" latinLnBrk="0" hangingPunct="1">
-              <a:lnSpc>
-                <a:spcPct val="90000"/>
-              </a:lnSpc>
-              <a:spcBef>
-                <a:spcPts val="500"/>
-              </a:spcBef>
-              <a:buFont typeface="Arial" panose="020B0604020202020204" pitchFamily="34" charset="0"/>
-              <a:buChar char="•"/>
-              <a:defRPr sz="1800" kern="1200">
-                <a:solidFill>
-                  <a:schemeClr val="tx1"/>
-                </a:solidFill>
-                <a:latin typeface="+mn-lt"/>
-                <a:ea typeface="+mn-ea"/>
-                <a:cs typeface="+mn-cs"/>
-              </a:defRPr>
-            </a:lvl8pPr>
-            <a:lvl9pPr marL="3886200" indent="-228600" algn="l" defTabSz="914400" rtl="0" eaLnBrk="1" latinLnBrk="0" hangingPunct="1">
-              <a:lnSpc>
-                <a:spcPct val="90000"/>
-              </a:lnSpc>
-              <a:spcBef>
-                <a:spcPts val="500"/>
-              </a:spcBef>
-              <a:buFont typeface="Arial" panose="020B0604020202020204" pitchFamily="34" charset="0"/>
-              <a:buChar char="•"/>
-              <a:defRPr sz="1800" kern="1200">
-                <a:solidFill>
-                  <a:schemeClr val="tx1"/>
-                </a:solidFill>
-                <a:latin typeface="+mn-lt"/>
-                <a:ea typeface="+mn-ea"/>
-                <a:cs typeface="+mn-cs"/>
-              </a:defRPr>
-            </a:lvl9pPr>
-          </a:lstStyle>
-          <a:p>
-            <a:pPr algn="ctr">
-              <a:buNone/>
-            </a:pPr>
-            <a:r>
-              <a:rPr lang="en-US" altLang="zh-CN" sz="2800" dirty="0">
-                <a:sym typeface="+mn-ea"/>
-              </a:rPr>
-              <a:t>Children</a:t>
-            </a:r>
-          </a:p>
-          <a:p>
-            <a:pPr algn="ctr">
-              <a:buNone/>
-            </a:pPr>
-            <a:r>
-              <a:rPr lang="ja-JP" altLang="en-US" sz="2800">
-                <a:sym typeface="+mn-ea"/>
-              </a:rPr>
-              <a:t>孩子</a:t>
-            </a:r>
-            <a:endParaRPr lang="en-US" altLang="zh-CN" sz="2800" dirty="0">
-              <a:sym typeface="+mn-ea"/>
-            </a:endParaRPr>
-          </a:p>
-        </p:txBody>
-      </p:sp>
-      <p:sp>
-        <p:nvSpPr>
-          <p:cNvPr id="22" name="TextBox 21">
-            <a:extLst>
-              <a:ext uri="{FF2B5EF4-FFF2-40B4-BE49-F238E27FC236}">
-                <a16:creationId xmlns:a16="http://schemas.microsoft.com/office/drawing/2014/main" id="{E26BFCA8-0094-94AC-EA70-0D4D489DA72E}"/>
-              </a:ext>
-            </a:extLst>
-          </p:cNvPr>
-          <p:cNvSpPr txBox="1"/>
-          <p:nvPr/>
-        </p:nvSpPr>
-        <p:spPr>
-          <a:xfrm>
-            <a:off x="-38101" y="20468"/>
-            <a:ext cx="12192000" cy="461665"/>
-          </a:xfrm>
-          <a:prstGeom prst="rect">
-            <a:avLst/>
-          </a:prstGeom>
-          <a:solidFill>
-            <a:schemeClr val="accent1"/>
-          </a:solidFill>
-          <a:ln>
-            <a:solidFill>
-              <a:schemeClr val="bg1">
-                <a:lumMod val="95000"/>
-              </a:schemeClr>
-            </a:solidFill>
-          </a:ln>
-        </p:spPr>
-        <p:txBody>
-          <a:bodyPr wrap="square">
-            <a:spAutoFit/>
-          </a:bodyPr>
-          <a:lstStyle/>
-          <a:p>
-            <a:pPr algn="ctr">
-              <a:buNone/>
-            </a:pPr>
-            <a:r>
-              <a:rPr lang="en-US" altLang="zh-CN" sz="2400" dirty="0">
-                <a:solidFill>
-                  <a:schemeClr val="bg1"/>
-                </a:solidFill>
-              </a:rPr>
-              <a:t>Remember: Trilateral Relationship</a:t>
-            </a:r>
-          </a:p>
-        </p:txBody>
-      </p:sp>
-      <p:cxnSp>
-        <p:nvCxnSpPr>
-          <p:cNvPr id="12" name="Straight Connector 11">
-            <a:extLst>
-              <a:ext uri="{FF2B5EF4-FFF2-40B4-BE49-F238E27FC236}">
-                <a16:creationId xmlns:a16="http://schemas.microsoft.com/office/drawing/2014/main" id="{6A13E17D-7518-9CFE-9520-586535E4C846}"/>
-              </a:ext>
-            </a:extLst>
-          </p:cNvPr>
-          <p:cNvCxnSpPr>
-            <a:cxnSpLocks/>
-          </p:cNvCxnSpPr>
-          <p:nvPr/>
-        </p:nvCxnSpPr>
-        <p:spPr bwMode="auto">
-          <a:xfrm>
-            <a:off x="6455992" y="2545193"/>
-            <a:ext cx="3371488" cy="2519193"/>
-          </a:xfrm>
-          <a:prstGeom prst="line">
-            <a:avLst/>
-          </a:prstGeom>
-          <a:gradFill rotWithShape="0">
-            <a:gsLst>
-              <a:gs pos="0">
-                <a:schemeClr val="accent1"/>
-              </a:gs>
-              <a:gs pos="100000">
-                <a:schemeClr val="accent2"/>
-              </a:gs>
-            </a:gsLst>
-            <a:lin ang="5400000" scaled="1"/>
-          </a:gradFill>
-          <a:ln w="63500" cap="flat" cmpd="sng" algn="ctr">
-            <a:solidFill>
-              <a:schemeClr val="accent1">
-                <a:alpha val="50000"/>
-              </a:schemeClr>
-            </a:solidFill>
-            <a:prstDash val="solid"/>
-            <a:round/>
-            <a:headEnd type="triangle" w="med" len="med"/>
-            <a:tailEnd type="triangle" w="med" len="med"/>
-          </a:ln>
-        </p:spPr>
-      </p:cxnSp>
-      <p:cxnSp>
-        <p:nvCxnSpPr>
-          <p:cNvPr id="14" name="Straight Connector 13">
-            <a:extLst>
-              <a:ext uri="{FF2B5EF4-FFF2-40B4-BE49-F238E27FC236}">
-                <a16:creationId xmlns:a16="http://schemas.microsoft.com/office/drawing/2014/main" id="{F3CC86EB-02B8-C828-E1DA-36C9A2B9326A}"/>
-              </a:ext>
-            </a:extLst>
-          </p:cNvPr>
-          <p:cNvCxnSpPr>
-            <a:cxnSpLocks/>
-            <a:stCxn id="3" idx="3"/>
-            <a:endCxn id="8" idx="1"/>
-          </p:cNvCxnSpPr>
-          <p:nvPr/>
-        </p:nvCxnSpPr>
-        <p:spPr bwMode="auto">
-          <a:xfrm>
-            <a:off x="2227580" y="5794149"/>
-            <a:ext cx="7599900" cy="0"/>
-          </a:xfrm>
-          <a:prstGeom prst="line">
-            <a:avLst/>
-          </a:prstGeom>
-          <a:gradFill rotWithShape="0">
-            <a:gsLst>
-              <a:gs pos="0">
-                <a:schemeClr val="accent1"/>
-              </a:gs>
-              <a:gs pos="100000">
-                <a:schemeClr val="accent2"/>
-              </a:gs>
-            </a:gsLst>
-            <a:lin ang="5400000" scaled="1"/>
-          </a:gradFill>
-          <a:ln w="63500" cap="flat" cmpd="sng" algn="ctr">
-            <a:solidFill>
-              <a:schemeClr val="accent1">
-                <a:alpha val="50361"/>
-              </a:schemeClr>
-            </a:solidFill>
-            <a:prstDash val="solid"/>
-            <a:round/>
-            <a:headEnd type="triangle" w="med" len="med"/>
-            <a:tailEnd type="triangle" w="med" len="med"/>
-          </a:ln>
-        </p:spPr>
-      </p:cxnSp>
-      <p:cxnSp>
-        <p:nvCxnSpPr>
-          <p:cNvPr id="10" name="Straight Connector 9">
-            <a:extLst>
-              <a:ext uri="{FF2B5EF4-FFF2-40B4-BE49-F238E27FC236}">
-                <a16:creationId xmlns:a16="http://schemas.microsoft.com/office/drawing/2014/main" id="{99A4DE5E-D9D8-9A2A-8455-C801006475BB}"/>
-              </a:ext>
-            </a:extLst>
-          </p:cNvPr>
-          <p:cNvCxnSpPr>
-            <a:cxnSpLocks/>
-          </p:cNvCxnSpPr>
-          <p:nvPr/>
-        </p:nvCxnSpPr>
-        <p:spPr bwMode="auto">
-          <a:xfrm flipH="1">
-            <a:off x="2227580" y="2545193"/>
-            <a:ext cx="2776576" cy="2519193"/>
-          </a:xfrm>
-          <a:prstGeom prst="line">
-            <a:avLst/>
-          </a:prstGeom>
-          <a:ln w="63500">
-            <a:solidFill>
-              <a:schemeClr val="accent1">
-                <a:alpha val="49523"/>
-              </a:schemeClr>
-            </a:solidFill>
-            <a:headEnd type="triangle" w="med" len="med"/>
-            <a:tailEnd type="triangle" w="med" len="med"/>
-          </a:ln>
-        </p:spPr>
-        <p:style>
-          <a:lnRef idx="3">
-            <a:schemeClr val="accent1"/>
-          </a:lnRef>
-          <a:fillRef idx="0">
-            <a:schemeClr val="accent1"/>
-          </a:fillRef>
-          <a:effectRef idx="2">
-            <a:schemeClr val="accent1"/>
-          </a:effectRef>
-          <a:fontRef idx="minor">
-            <a:schemeClr val="tx1"/>
-          </a:fontRef>
-        </p:style>
-      </p:cxnSp>
-    </p:spTree>
-    <p:extLst>
-      <p:ext uri="{BB962C8B-B14F-4D97-AF65-F5344CB8AC3E}">
-        <p14:creationId xmlns:p14="http://schemas.microsoft.com/office/powerpoint/2010/main" val="5006158"/>
-      </p:ext>
-    </p:extLst>
-  </p:cSld>
-  <p:clrMapOvr>
-    <a:masterClrMapping/>
-  </p:clrMapOvr>
-</p:sld>
-</file>
-
-<file path=ppt/slides/slide8.xml><?xml version="1.0" encoding="utf-8"?>
-<p:sld xmlns:a="http://schemas.openxmlformats.org/drawingml/2006/main" xmlns:r="http://schemas.openxmlformats.org/officeDocument/2006/relationships" xmlns:p="http://schemas.openxmlformats.org/presentationml/2006/main">
-  <p:cSld>
-    <p:spTree>
-      <p:nvGrpSpPr>
-        <p:cNvPr id="1" name=""/>
-        <p:cNvGrpSpPr/>
-        <p:nvPr/>
-      </p:nvGrpSpPr>
-      <p:grpSpPr>
-        <a:xfrm>
-          <a:off x="0" y="0"/>
-          <a:ext cx="0" cy="0"/>
-          <a:chOff x="0" y="0"/>
-          <a:chExt cx="0" cy="0"/>
-        </a:xfrm>
-      </p:grpSpPr>
-      <p:sp>
-        <p:nvSpPr>
           <p:cNvPr id="2" name="Title 1"/>
           <p:cNvSpPr>
             <a:spLocks noGrp="1"/>
@@ -6074,6 +5243,19 @@
               <a:t>個人反思</a:t>
             </a:r>
             <a:r>
+              <a:rPr lang="en-US" altLang="zh-CN" b="1" dirty="0">
+                <a:solidFill>
+                  <a:srgbClr val="00B050"/>
+                </a:solidFill>
+                <a:highlight>
+                  <a:srgbClr val="FFFF00"/>
+                </a:highlight>
+                <a:latin typeface="DFKai-SB" panose="03000509000000000000" pitchFamily="65" charset="-120"/>
+                <a:ea typeface="DFKai-SB" panose="03000509000000000000" pitchFamily="65" charset="-120"/>
+              </a:rPr>
+              <a:t> Personal Reflection</a:t>
+            </a:r>
+            <a:r>
               <a:rPr lang="zh-CN" altLang="en-US" sz="2800" b="1" dirty="0">
                 <a:solidFill>
                   <a:srgbClr val="00B050"/>
@@ -6095,42 +5277,7 @@
               <a:rPr lang="en-US" altLang="zh-CN" sz="2800" dirty="0">
                 <a:sym typeface="+mn-ea"/>
               </a:rPr>
-              <a:t>“</a:t>
-            </a:r>
-            <a:r>
-              <a:rPr lang="zh-CN" altLang="en-US" sz="2800" dirty="0">
-                <a:sym typeface="+mn-ea"/>
-              </a:rPr>
-              <a:t>我愿意让孩子相信神，但对我来说无所谓 。</a:t>
-            </a:r>
-            <a:r>
-              <a:rPr lang="en-US" altLang="zh-CN" sz="2800" dirty="0">
-                <a:sym typeface="+mn-ea"/>
-              </a:rPr>
-              <a:t>” </a:t>
-            </a:r>
-            <a:r>
-              <a:rPr lang="ja-JP" altLang="en-US" sz="2800">
-                <a:sym typeface="+mn-ea"/>
-              </a:rPr>
-              <a:t>对吗</a:t>
-            </a:r>
-            <a:r>
-              <a:rPr lang="en-US" altLang="ja-JP" sz="2800" dirty="0">
-                <a:sym typeface="+mn-ea"/>
-              </a:rPr>
-              <a:t>? </a:t>
-            </a:r>
-          </a:p>
-          <a:p>
-            <a:pPr marL="357505" indent="-357505" algn="l">
-              <a:buNone/>
-            </a:pPr>
-            <a:r>
-              <a:rPr lang="en-US" altLang="zh-CN" sz="2800" dirty="0">
-                <a:sym typeface="+mn-ea"/>
-              </a:rPr>
-              <a:t>“I hope my children to believe in God. But it doesn’t matter to me.” Is that right?</a:t>
+              <a:t>If you travel overseas, what do you want to bring with you? </a:t>
             </a:r>
           </a:p>
           <a:p>
@@ -6150,6 +5297,38 @@
             </a:endParaRPr>
           </a:p>
           <a:p>
+            <a:pPr marL="357505" indent="-357505" algn="l">
+              <a:buNone/>
+            </a:pPr>
+            <a:endParaRPr lang="en-US" altLang="zh-CN" sz="2800" b="1" dirty="0">
+              <a:solidFill>
+                <a:srgbClr val="7030A0"/>
+              </a:solidFill>
+              <a:highlight>
+                <a:srgbClr val="FFFF00"/>
+              </a:highlight>
+              <a:latin typeface="DFKai-SB" panose="03000509000000000000" pitchFamily="65" charset="-120"/>
+              <a:ea typeface="DFKai-SB" panose="03000509000000000000" pitchFamily="65" charset="-120"/>
+              <a:sym typeface="+mn-ea"/>
+            </a:endParaRPr>
+          </a:p>
+          <a:p>
+            <a:pPr marL="357505" indent="-357505" algn="l">
+              <a:buNone/>
+            </a:pPr>
+            <a:endParaRPr lang="en-US" altLang="zh-CN" sz="2800" b="1" dirty="0">
+              <a:solidFill>
+                <a:srgbClr val="7030A0"/>
+              </a:solidFill>
+              <a:highlight>
+                <a:srgbClr val="FFFF00"/>
+              </a:highlight>
+              <a:latin typeface="DFKai-SB" panose="03000509000000000000" pitchFamily="65" charset="-120"/>
+              <a:ea typeface="DFKai-SB" panose="03000509000000000000" pitchFamily="65" charset="-120"/>
+              <a:sym typeface="+mn-ea"/>
+            </a:endParaRPr>
+          </a:p>
+          <a:p>
             <a:pPr marL="357505" indent="-357505">
               <a:buNone/>
             </a:pPr>
@@ -6189,26 +5368,6 @@
               <a:buNone/>
             </a:pPr>
             <a:r>
-              <a:rPr lang="en-US" altLang="ja-JP" sz="2800" b="1" dirty="0">
-                <a:solidFill>
-                  <a:srgbClr val="00B0F0"/>
-                </a:solidFill>
-                <a:latin typeface="DFKai-SB" panose="03000509000000000000" pitchFamily="65" charset="-120"/>
-                <a:ea typeface="DFKai-SB" panose="03000509000000000000" pitchFamily="65" charset="-120"/>
-              </a:rPr>
-              <a:t>"</a:t>
-            </a:r>
-            <a:r>
-              <a:rPr lang="ja-JP" altLang="en-US" sz="2800">
-                <a:solidFill>
-                  <a:srgbClr val="00B0F0"/>
-                </a:solidFill>
-                <a:latin typeface="DFKai-SB" panose="03000509000000000000" pitchFamily="65" charset="-120"/>
-                <a:ea typeface="DFKai-SB" panose="03000509000000000000" pitchFamily="65" charset="-120"/>
-              </a:rPr>
-              <a:t>至于我、和我家、我们必定事奉耶和华。</a:t>
-            </a:r>
-            <a:r>
               <a:rPr lang="en-US" altLang="ja-JP" sz="2800" dirty="0">
                 <a:solidFill>
                   <a:srgbClr val="00B0F0"/>
@@ -6216,7 +5375,7 @@
                 <a:latin typeface="DFKai-SB" panose="03000509000000000000" pitchFamily="65" charset="-120"/>
                 <a:ea typeface="DFKai-SB" panose="03000509000000000000" pitchFamily="65" charset="-120"/>
               </a:rPr>
-              <a:t>" (Jos24:15 CUVS) </a:t>
+              <a:t>"Do not take along any gold or silver or copper in your belts; "Do not take along any gold or silver or copper in your belts;" (Mat10:9-10 NIV) </a:t>
             </a:r>
             <a:endParaRPr lang="en-US" altLang="ja-JP" sz="2800" b="1" dirty="0">
               <a:solidFill>
@@ -6235,7 +5394,35 @@
                 <a:latin typeface="DFKai-SB" panose="03000509000000000000" pitchFamily="65" charset="-120"/>
                 <a:ea typeface="DFKai-SB" panose="03000509000000000000" pitchFamily="65" charset="-120"/>
               </a:rPr>
-              <a:t>“as for me and my household, we will serve the Lord ." (Jos24:15 NIV).</a:t>
+              <a:t>“</a:t>
+            </a:r>
+            <a:r>
+              <a:rPr lang="ja-JP" altLang="en-US" sz="2800">
+                <a:latin typeface="DFKai-SB" panose="03000509000000000000" pitchFamily="65" charset="-120"/>
+                <a:ea typeface="DFKai-SB" panose="03000509000000000000" pitchFamily="65" charset="-120"/>
+              </a:rPr>
+              <a:t>腰袋里、不要带金银铜钱。</a:t>
+            </a:r>
+            <a:r>
+              <a:rPr lang="en-US" altLang="ja-JP" sz="2800" dirty="0">
+                <a:latin typeface="DFKai-SB" panose="03000509000000000000" pitchFamily="65" charset="-120"/>
+                <a:ea typeface="DFKai-SB" panose="03000509000000000000" pitchFamily="65" charset="-120"/>
+              </a:rPr>
+              <a:t>"</a:t>
+            </a:r>
+            <a:r>
+              <a:rPr lang="ja-JP" altLang="en-US" sz="2800">
+                <a:latin typeface="DFKai-SB" panose="03000509000000000000" pitchFamily="65" charset="-120"/>
+                <a:ea typeface="DFKai-SB" panose="03000509000000000000" pitchFamily="65" charset="-120"/>
+              </a:rPr>
+              <a:t>行路不要带口袋、不要带两件褂子、也不要带鞋和拐杖．因为工人得饮食、是应当的。</a:t>
+            </a:r>
+            <a:r>
+              <a:rPr lang="en-US" altLang="ja-JP" sz="2800" dirty="0">
+                <a:latin typeface="DFKai-SB" panose="03000509000000000000" pitchFamily="65" charset="-120"/>
+                <a:ea typeface="DFKai-SB" panose="03000509000000000000" pitchFamily="65" charset="-120"/>
+              </a:rPr>
+              <a:t>" (CUV)</a:t>
             </a:r>
             <a:endParaRPr lang="zh-CN" altLang="en-US" sz="2800" dirty="0">
               <a:latin typeface="DFKai-SB" panose="03000509000000000000" pitchFamily="65" charset="-120"/>
@@ -6252,7 +5439,7 @@
 </p:sld>
 </file>
 
-<file path=ppt/slides/slide9.xml><?xml version="1.0" encoding="utf-8"?>
+<file path=ppt/slides/slide8.xml><?xml version="1.0" encoding="utf-8"?>
 <p:sld xmlns:a="http://schemas.openxmlformats.org/drawingml/2006/main" xmlns:r="http://schemas.openxmlformats.org/officeDocument/2006/relationships" xmlns:p="http://schemas.openxmlformats.org/presentationml/2006/main">
   <p:cSld>
     <p:spTree>
@@ -6362,6 +5549,273 @@
         <p14:creationId xmlns:p14="http://schemas.microsoft.com/office/powerpoint/2010/main" val="3761109616"/>
       </p:ext>
     </p:extLst>
+  </p:cSld>
+  <p:clrMapOvr>
+    <a:masterClrMapping/>
+  </p:clrMapOvr>
+</p:sld>
+</file>
+
+<file path=ppt/slides/slide9.xml><?xml version="1.0" encoding="utf-8"?>
+<p:sld xmlns:a="http://schemas.openxmlformats.org/drawingml/2006/main" xmlns:r="http://schemas.openxmlformats.org/officeDocument/2006/relationships" xmlns:p="http://schemas.openxmlformats.org/presentationml/2006/main">
+  <p:cSld>
+    <p:spTree>
+      <p:nvGrpSpPr>
+        <p:cNvPr id="1" name=""/>
+        <p:cNvGrpSpPr/>
+        <p:nvPr/>
+      </p:nvGrpSpPr>
+      <p:grpSpPr>
+        <a:xfrm>
+          <a:off x="0" y="0"/>
+          <a:ext cx="0" cy="0"/>
+          <a:chOff x="0" y="0"/>
+          <a:chExt cx="0" cy="0"/>
+        </a:xfrm>
+      </p:grpSpPr>
+      <p:sp>
+        <p:nvSpPr>
+          <p:cNvPr id="2" name="Title 1"/>
+          <p:cNvSpPr>
+            <a:spLocks noGrp="1"/>
+          </p:cNvSpPr>
+          <p:nvPr>
+            <p:ph type="title"/>
+          </p:nvPr>
+        </p:nvSpPr>
+        <p:spPr/>
+        <p:txBody>
+          <a:bodyPr/>
+          <a:lstStyle/>
+          <a:p>
+            <a:endParaRPr lang="en-US"/>
+          </a:p>
+        </p:txBody>
+      </p:sp>
+      <p:pic>
+        <p:nvPicPr>
+          <p:cNvPr id="7" name="Content Placeholder 6" descr="Screenshot 2025-07-31 213648"/>
+          <p:cNvPicPr>
+            <a:picLocks noGrp="1" noChangeAspect="1"/>
+          </p:cNvPicPr>
+          <p:nvPr>
+            <p:ph sz="half" idx="2"/>
+          </p:nvPr>
+        </p:nvPicPr>
+        <p:blipFill>
+          <a:blip r:embed="rId2"/>
+          <a:srcRect r="15739" b="9740"/>
+          <a:stretch>
+            <a:fillRect/>
+          </a:stretch>
+        </p:blipFill>
+        <p:spPr>
+          <a:xfrm>
+            <a:off x="6443980" y="633095"/>
+            <a:ext cx="5289550" cy="3101975"/>
+          </a:xfrm>
+          <a:prstGeom prst="rect">
+            <a:avLst/>
+          </a:prstGeom>
+        </p:spPr>
+      </p:pic>
+      <p:sp>
+        <p:nvSpPr>
+          <p:cNvPr id="6" name="Text Box 5"/>
+          <p:cNvSpPr txBox="1"/>
+          <p:nvPr/>
+        </p:nvSpPr>
+        <p:spPr>
+          <a:xfrm>
+            <a:off x="458470" y="2784108"/>
+            <a:ext cx="5203191" cy="2308324"/>
+          </a:xfrm>
+          <a:prstGeom prst="rect">
+            <a:avLst/>
+          </a:prstGeom>
+          <a:noFill/>
+        </p:spPr>
+        <p:txBody>
+          <a:bodyPr wrap="square" rtlCol="0" anchor="t">
+            <a:spAutoFit/>
+          </a:bodyPr>
+          <a:lstStyle/>
+          <a:p>
+            <a:pPr marL="635" indent="-635">
+              <a:buNone/>
+            </a:pPr>
+            <a:r>
+              <a:rPr lang="en-US" altLang="en-US" sz="2400" dirty="0">
+                <a:sym typeface="+mn-ea"/>
+              </a:rPr>
+              <a:t>1.No Turning Back</a:t>
+            </a:r>
+          </a:p>
+          <a:p>
+            <a:pPr marL="635" indent="-635">
+              <a:buNone/>
+            </a:pPr>
+            <a:r>
+              <a:rPr lang="en-US" altLang="en-US" sz="2400" dirty="0">
+                <a:solidFill>
+                  <a:srgbClr val="FF0000"/>
+                </a:solidFill>
+                <a:sym typeface="+mn-ea"/>
+                <a:hlinkClick r:id="rId3"/>
+              </a:rPr>
+              <a:t>https://</a:t>
+            </a:r>
+            <a:r>
+              <a:rPr lang="en-US" altLang="en-US" sz="2400" dirty="0" err="1">
+                <a:solidFill>
+                  <a:srgbClr val="FF0000"/>
+                </a:solidFill>
+                <a:sym typeface="+mn-ea"/>
+                <a:hlinkClick r:id="rId3"/>
+              </a:rPr>
+              <a:t>www.youtube.com</a:t>
+            </a:r>
+            <a:r>
+              <a:rPr lang="en-US" altLang="en-US" sz="2400" dirty="0">
+                <a:solidFill>
+                  <a:srgbClr val="FF0000"/>
+                </a:solidFill>
+                <a:sym typeface="+mn-ea"/>
+                <a:hlinkClick r:id="rId3"/>
+              </a:rPr>
+              <a:t>/</a:t>
+            </a:r>
+            <a:r>
+              <a:rPr lang="en-US" altLang="en-US" sz="2400" dirty="0" err="1">
+                <a:solidFill>
+                  <a:srgbClr val="FF0000"/>
+                </a:solidFill>
+                <a:sym typeface="+mn-ea"/>
+                <a:hlinkClick r:id="rId3"/>
+              </a:rPr>
+              <a:t>watch?v</a:t>
+            </a:r>
+            <a:r>
+              <a:rPr lang="en-US" altLang="en-US" sz="2400" dirty="0">
+                <a:solidFill>
+                  <a:srgbClr val="FF0000"/>
+                </a:solidFill>
+                <a:sym typeface="+mn-ea"/>
+                <a:hlinkClick r:id="rId3"/>
+              </a:rPr>
+              <a:t>=yNtid3wdDWA&amp;list=RDyNtid3wdDWA&amp;start_radio=1&amp;ab_channel=</a:t>
+            </a:r>
+            <a:r>
+              <a:rPr lang="en-US" altLang="en-US" sz="2400" dirty="0" err="1">
+                <a:solidFill>
+                  <a:srgbClr val="FF0000"/>
+                </a:solidFill>
+                <a:sym typeface="+mn-ea"/>
+                <a:hlinkClick r:id="rId3"/>
+              </a:rPr>
+              <a:t>GaiseBaba</a:t>
+            </a:r>
+            <a:r>
+              <a:rPr lang="en-US" altLang="en-US" sz="2400" dirty="0">
+                <a:sym typeface="+mn-ea"/>
+                <a:hlinkClick r:id="rId3"/>
+              </a:rPr>
+              <a:t>         </a:t>
+            </a:r>
+            <a:endParaRPr lang="en-US" altLang="en-US" sz="2400" dirty="0">
+              <a:sym typeface="+mn-ea"/>
+            </a:endParaRPr>
+          </a:p>
+          <a:p>
+            <a:pPr marL="635" indent="-635">
+              <a:buNone/>
+            </a:pPr>
+            <a:r>
+              <a:rPr lang="en-US" altLang="en-US" sz="2400" dirty="0">
+                <a:sym typeface="+mn-ea"/>
+              </a:rPr>
+              <a:t>Christian Kids</a:t>
+            </a:r>
+          </a:p>
+        </p:txBody>
+      </p:sp>
+      <p:sp>
+        <p:nvSpPr>
+          <p:cNvPr id="8" name="Text Box 7"/>
+          <p:cNvSpPr txBox="1"/>
+          <p:nvPr/>
+        </p:nvSpPr>
+        <p:spPr>
+          <a:xfrm>
+            <a:off x="6443980" y="3938270"/>
+            <a:ext cx="5399405" cy="2308324"/>
+          </a:xfrm>
+          <a:prstGeom prst="rect">
+            <a:avLst/>
+          </a:prstGeom>
+          <a:noFill/>
+        </p:spPr>
+        <p:txBody>
+          <a:bodyPr wrap="square" rtlCol="0" anchor="t">
+            <a:spAutoFit/>
+          </a:bodyPr>
+          <a:lstStyle/>
+          <a:p>
+            <a:pPr marL="0" indent="0" algn="l">
+              <a:buNone/>
+            </a:pPr>
+            <a:r>
+              <a:rPr lang="en-US" altLang="en-US" sz="2000" dirty="0">
+                <a:sym typeface="+mn-ea"/>
+              </a:rPr>
+              <a:t>2</a:t>
+            </a:r>
+            <a:r>
+              <a:rPr lang="en-US" altLang="en-US" sz="2400" dirty="0">
+                <a:sym typeface="+mn-ea"/>
+              </a:rPr>
+              <a:t>.</a:t>
+            </a:r>
+            <a:r>
+              <a:rPr lang="en-US" altLang="en-US" sz="2400" dirty="0">
+                <a:solidFill>
+                  <a:srgbClr val="FF0000"/>
+                </a:solidFill>
+                <a:sym typeface="+mn-ea"/>
+              </a:rPr>
+              <a:t> The Song of Moses </a:t>
+            </a:r>
+            <a:r>
+              <a:rPr lang="en-US" altLang="en-US" sz="2400" dirty="0">
+                <a:solidFill>
+                  <a:srgbClr val="00B050"/>
+                </a:solidFill>
+                <a:sym typeface="+mn-ea"/>
+                <a:hlinkClick r:id="rId4"/>
+              </a:rPr>
+              <a:t>https://www.youtube.com/watch?v=a-wWKL-7Mrg</a:t>
+            </a:r>
+            <a:endParaRPr lang="en-US" altLang="en-US" sz="2400" dirty="0">
+              <a:solidFill>
+                <a:srgbClr val="00B050"/>
+              </a:solidFill>
+              <a:sym typeface="+mn-ea"/>
+            </a:endParaRPr>
+          </a:p>
+          <a:p>
+            <a:pPr marL="0" indent="0" algn="l">
+              <a:buNone/>
+            </a:pPr>
+            <a:r>
+              <a:rPr lang="en-US" altLang="en-US" sz="2400" dirty="0">
+                <a:sym typeface="+mn-ea"/>
+              </a:rPr>
+              <a:t>The Song of Moses Like You've Never Heard Before | Christian Worship Song/  World Wide Worship</a:t>
+            </a:r>
+          </a:p>
+        </p:txBody>
+      </p:sp>
+    </p:spTree>
   </p:cSld>
   <p:clrMapOvr>
     <a:masterClrMapping/>

</xml_diff>